<commit_message>
Powerpoint presentatie CBS aangepast
</commit_message>
<xml_diff>
--- a/PPT/CBS.pptx
+++ b/PPT/CBS.pptx
@@ -111,6 +111,11 @@
       </a:defRPr>
     </a:lvl9pPr>
   </p:defaultTextStyle>
+  <p:extLst>
+    <p:ext uri="{EFAFB233-063F-42B5-8137-9DF3F51BA10A}">
+      <p15:sldGuideLst xmlns:p15="http://schemas.microsoft.com/office/powerpoint/2012/main"/>
+    </p:ext>
+  </p:extLst>
 </p:presentation>
 </file>
 
@@ -3820,7 +3825,6 @@
               <a:rPr lang="nl-NL" dirty="0" smtClean="0"/>
               <a:t>Alleen vindbaar via data.overheid.nl</a:t>
             </a:r>
-            <a:endParaRPr lang="nl-NL" dirty="0" smtClean="0"/>
           </a:p>
           <a:p>
             <a:r>
@@ -3959,11 +3963,7 @@
             </a:br>
             <a:r>
               <a:rPr lang="nl-NL" dirty="0" smtClean="0"/>
-              <a:t>100 of 500 meter vakken, </a:t>
-            </a:r>
-            <a:r>
-              <a:rPr lang="nl-NL" dirty="0" smtClean="0"/>
-              <a:t>buurten, wijken, pc-gebieden, gemeenten?</a:t>
+              <a:t>100 of 500 meter vakken, buurten, wijken, pc-gebieden, gemeenten?</a:t>
             </a:r>
           </a:p>
           <a:p>
@@ -4010,7 +4010,31 @@
             </a:r>
             <a:r>
               <a:rPr lang="nl-NL" dirty="0" smtClean="0"/>
-              <a:t> Feed en WFS?</a:t>
+              <a:t> Feed en WFS</a:t>
+            </a:r>
+            <a:r>
+              <a:rPr lang="nl-NL" dirty="0" smtClean="0"/>
+              <a:t>?</a:t>
+            </a:r>
+          </a:p>
+          <a:p>
+            <a:r>
+              <a:rPr lang="nl-NL" dirty="0" smtClean="0"/>
+              <a:t>Data bij de bron of kopie in </a:t>
+            </a:r>
+            <a:r>
+              <a:rPr lang="nl-NL" dirty="0" err="1" smtClean="0"/>
+              <a:t>geodatabase</a:t>
+            </a:r>
+            <a:r>
+              <a:rPr lang="nl-NL" dirty="0" smtClean="0"/>
+              <a:t> of DWH?</a:t>
+            </a:r>
+          </a:p>
+          <a:p>
+            <a:r>
+              <a:rPr lang="nl-NL" dirty="0" smtClean="0"/>
+              <a:t>Wel of geen historie?</a:t>
             </a:r>
             <a:endParaRPr lang="nl-NL" dirty="0"/>
           </a:p>

</xml_diff>